<commit_message>
siting github link in documents
</commit_message>
<xml_diff>
--- a/Dynamic wallpaper application presentation.pptx
+++ b/Dynamic wallpaper application presentation.pptx
@@ -14222,7 +14222,7 @@
           <a:p>
             <a:fld id="{846CE7D5-CF57-46EF-B807-FDD0502418D4}" type="datetimeFigureOut">
               <a:rPr lang="en-US" smtClean="0"/>
-              <a:t>9/18/2024</a:t>
+              <a:t>9/19/2024</a:t>
             </a:fld>
             <a:endParaRPr lang="en-US"/>
           </a:p>
@@ -14392,7 +14392,7 @@
           <a:p>
             <a:fld id="{846CE7D5-CF57-46EF-B807-FDD0502418D4}" type="datetimeFigureOut">
               <a:rPr lang="en-US" smtClean="0"/>
-              <a:t>9/18/2024</a:t>
+              <a:t>9/19/2024</a:t>
             </a:fld>
             <a:endParaRPr lang="en-US"/>
           </a:p>
@@ -14572,7 +14572,7 @@
           <a:p>
             <a:fld id="{846CE7D5-CF57-46EF-B807-FDD0502418D4}" type="datetimeFigureOut">
               <a:rPr lang="en-US" smtClean="0"/>
-              <a:t>9/18/2024</a:t>
+              <a:t>9/19/2024</a:t>
             </a:fld>
             <a:endParaRPr lang="en-US"/>
           </a:p>
@@ -14742,7 +14742,7 @@
           <a:p>
             <a:fld id="{846CE7D5-CF57-46EF-B807-FDD0502418D4}" type="datetimeFigureOut">
               <a:rPr lang="en-US" smtClean="0"/>
-              <a:t>9/18/2024</a:t>
+              <a:t>9/19/2024</a:t>
             </a:fld>
             <a:endParaRPr lang="en-US"/>
           </a:p>
@@ -14988,7 +14988,7 @@
           <a:p>
             <a:fld id="{846CE7D5-CF57-46EF-B807-FDD0502418D4}" type="datetimeFigureOut">
               <a:rPr lang="en-US" smtClean="0"/>
-              <a:t>9/18/2024</a:t>
+              <a:t>9/19/2024</a:t>
             </a:fld>
             <a:endParaRPr lang="en-US"/>
           </a:p>
@@ -15220,7 +15220,7 @@
           <a:p>
             <a:fld id="{846CE7D5-CF57-46EF-B807-FDD0502418D4}" type="datetimeFigureOut">
               <a:rPr lang="en-US" smtClean="0"/>
-              <a:t>9/18/2024</a:t>
+              <a:t>9/19/2024</a:t>
             </a:fld>
             <a:endParaRPr lang="en-US"/>
           </a:p>
@@ -15587,7 +15587,7 @@
           <a:p>
             <a:fld id="{846CE7D5-CF57-46EF-B807-FDD0502418D4}" type="datetimeFigureOut">
               <a:rPr lang="en-US" smtClean="0"/>
-              <a:t>9/18/2024</a:t>
+              <a:t>9/19/2024</a:t>
             </a:fld>
             <a:endParaRPr lang="en-US"/>
           </a:p>
@@ -15705,7 +15705,7 @@
           <a:p>
             <a:fld id="{846CE7D5-CF57-46EF-B807-FDD0502418D4}" type="datetimeFigureOut">
               <a:rPr lang="en-US" smtClean="0"/>
-              <a:t>9/18/2024</a:t>
+              <a:t>9/19/2024</a:t>
             </a:fld>
             <a:endParaRPr lang="en-US"/>
           </a:p>
@@ -15800,7 +15800,7 @@
           <a:p>
             <a:fld id="{846CE7D5-CF57-46EF-B807-FDD0502418D4}" type="datetimeFigureOut">
               <a:rPr lang="en-US" smtClean="0"/>
-              <a:t>9/18/2024</a:t>
+              <a:t>9/19/2024</a:t>
             </a:fld>
             <a:endParaRPr lang="en-US"/>
           </a:p>
@@ -16077,7 +16077,7 @@
           <a:p>
             <a:fld id="{846CE7D5-CF57-46EF-B807-FDD0502418D4}" type="datetimeFigureOut">
               <a:rPr lang="en-US" smtClean="0"/>
-              <a:t>9/18/2024</a:t>
+              <a:t>9/19/2024</a:t>
             </a:fld>
             <a:endParaRPr lang="en-US"/>
           </a:p>
@@ -16334,7 +16334,7 @@
           <a:p>
             <a:fld id="{846CE7D5-CF57-46EF-B807-FDD0502418D4}" type="datetimeFigureOut">
               <a:rPr lang="en-US" smtClean="0"/>
-              <a:t>9/18/2024</a:t>
+              <a:t>9/19/2024</a:t>
             </a:fld>
             <a:endParaRPr lang="en-US"/>
           </a:p>
@@ -16547,7 +16547,7 @@
           <a:p>
             <a:fld id="{846CE7D5-CF57-46EF-B807-FDD0502418D4}" type="datetimeFigureOut">
               <a:rPr lang="en-US" smtClean="0"/>
-              <a:t>9/18/2024</a:t>
+              <a:t>9/19/2024</a:t>
             </a:fld>
             <a:endParaRPr lang="en-US"/>
           </a:p>
@@ -27083,7 +27083,7 @@
               </a:rPr>
               <a:t>.</a:t>
             </a:r>
-            <a:endParaRPr lang="en-US"/>
+            <a:endParaRPr lang="en-US" dirty="0"/>
           </a:p>
           <a:p>
             <a:pPr marL="342900" indent="-342900" algn="l">
@@ -27111,7 +27111,7 @@
               </a:rPr>
               <a:t>.</a:t>
             </a:r>
-            <a:endParaRPr lang="en-US"/>
+            <a:endParaRPr lang="en-US" dirty="0"/>
           </a:p>
           <a:p>
             <a:pPr marL="342900" indent="-342900" algn="l">
@@ -27139,7 +27139,7 @@
               </a:rPr>
               <a:t>.</a:t>
             </a:r>
-            <a:endParaRPr lang="en-US"/>
+            <a:endParaRPr lang="en-US" dirty="0"/>
           </a:p>
           <a:p>
             <a:pPr marL="342900" indent="-342900" algn="l">
@@ -27174,7 +27174,7 @@
               </a:rPr>
               <a:t>.</a:t>
             </a:r>
-            <a:endParaRPr lang="en-US"/>
+            <a:endParaRPr lang="en-US" dirty="0"/>
           </a:p>
           <a:p>
             <a:pPr marL="342900" indent="-342900" algn="l">
@@ -27209,7 +27209,7 @@
               </a:rPr>
               <a:t>.</a:t>
             </a:r>
-            <a:endParaRPr lang="en-US"/>
+            <a:endParaRPr lang="en-US" dirty="0"/>
           </a:p>
           <a:p>
             <a:pPr marL="342900" indent="-342900" algn="l">
@@ -27258,18 +27258,28 @@
               </a:rPr>
               <a:t>.</a:t>
             </a:r>
-            <a:endParaRPr lang="en-US"/>
+            <a:endParaRPr lang="en-US" dirty="0"/>
           </a:p>
           <a:p>
             <a:pPr marL="57150" algn="l"/>
-            <a:endParaRPr lang="en-US" sz="2200" dirty="0"/>
+            <a:r>
+              <a:rPr lang="en-US" sz="2200" b="1" dirty="0" err="1"/>
+              <a:t>Github</a:t>
+            </a:r>
+            <a:r>
+              <a:rPr lang="en-US" sz="2200" b="1" dirty="0"/>
+              <a:t> link for project:</a:t>
+            </a:r>
           </a:p>
           <a:p>
             <a:pPr indent="-228600" algn="l">
               <a:buFont typeface="Arial" panose="020B0604020202020204" pitchFamily="34" charset="0"/>
               <a:buChar char="•"/>
             </a:pPr>
-            <a:endParaRPr lang="en-US" sz="2200"/>
+            <a:r>
+              <a:rPr lang="en-US" sz="2200" dirty="0"/>
+              <a:t>https://github.com/abusaad59/Pexel-Wallpaper.git</a:t>
+            </a:r>
           </a:p>
         </p:txBody>
       </p:sp>

</xml_diff>